<commit_message>
Improved showing pptx shapes Improved presentation New test for the for excel files with more features
</commit_message>
<xml_diff>
--- a/tools/tests/Test 3 - GDocs.pptx
+++ b/tools/tests/Test 3 - GDocs.pptx
@@ -13,6 +13,8 @@
     <p:sldId id="258" r:id="rId8"/>
     <p:sldId id="259" r:id="rId9"/>
     <p:sldId id="260" r:id="rId10"/>
+    <p:sldId id="261" r:id="rId11"/>
+    <p:sldId id="262" r:id="rId12"/>
   </p:sldIdLst>
   <p:sldSz cy="6858000" cx="9144000"/>
   <p:notesSz cy="9144000" cx="6858000"/>
@@ -679,7 +681,7 @@
   <p:cSld>
     <p:spTree>
       <p:nvGrpSpPr>
-        <p:cNvPr id="50" name="Shape 50"/>
+        <p:cNvPr id="54" name="Shape 54"/>
         <p:cNvGrpSpPr/>
         <p:nvPr/>
       </p:nvGrpSpPr>
@@ -693,7 +695,7 @@
       </p:grpSpPr>
       <p:sp>
         <p:nvSpPr>
-          <p:cNvPr id="51" name="Shape 51"/>
+          <p:cNvPr id="55" name="Shape 55"/>
           <p:cNvSpPr/>
           <p:nvPr>
             <p:ph idx="2" type="sldImg"/>
@@ -727,7 +729,175 @@
       </p:sp>
       <p:sp>
         <p:nvSpPr>
-          <p:cNvPr id="52" name="Shape 52"/>
+          <p:cNvPr id="56" name="Shape 56"/>
+          <p:cNvSpPr txBox="1"/>
+          <p:nvPr>
+            <p:ph idx="1" type="body"/>
+          </p:nvPr>
+        </p:nvSpPr>
+        <p:spPr>
+          <a:xfrm>
+            <a:off y="4343400" x="685800"/>
+            <a:ext cy="4114800" cx="5486399"/>
+          </a:xfrm>
+          <a:prstGeom prst="rect">
+            <a:avLst/>
+          </a:prstGeom>
+        </p:spPr>
+        <p:txBody>
+          <a:bodyPr bIns="91425" rIns="91425" lIns="91425" tIns="91425" anchor="t" anchorCtr="0">
+            <a:noAutofit/>
+          </a:bodyPr>
+          <a:lstStyle/>
+          <a:p/>
+        </p:txBody>
+      </p:sp>
+    </p:spTree>
+  </p:cSld>
+  <p:clrMapOvr>
+    <a:masterClrMapping/>
+  </p:clrMapOvr>
+</p:notes>
+</file>
+
+<file path=ppt/notesSlides/notesSlide6.xml><?xml version="1.0" encoding="utf-8"?>
+<p:notes xmlns:a="http://schemas.openxmlformats.org/drawingml/2006/main" xmlns:r="http://schemas.openxmlformats.org/officeDocument/2006/relationships" xmlns:mc="http://schemas.openxmlformats.org/markup-compatibility/2006" xmlns:mv="urn:schemas-microsoft-com:mac:vml" xmlns:p="http://schemas.openxmlformats.org/presentationml/2006/main" xmlns:c="http://schemas.openxmlformats.org/drawingml/2006/chart" xmlns:dgm="http://schemas.openxmlformats.org/drawingml/2006/diagram" xmlns:o="urn:schemas-microsoft-com:office:office" xmlns:v="urn:schemas-microsoft-com:vml" xmlns:pvml="urn:schemas-microsoft-com:office:powerpoint" xmlns:com="http://schemas.openxmlformats.org/drawingml/2006/compatibility" xmlns:p14="http://schemas.microsoft.com/office/powerpoint/2010/main" showMasterSp="0" showMasterPhAnim="0">
+  <p:cSld>
+    <p:spTree>
+      <p:nvGrpSpPr>
+        <p:cNvPr id="62" name="Shape 62"/>
+        <p:cNvGrpSpPr/>
+        <p:nvPr/>
+      </p:nvGrpSpPr>
+      <p:grpSpPr>
+        <a:xfrm>
+          <a:off y="0" x="0"/>
+          <a:ext cy="0" cx="0"/>
+          <a:chOff y="0" x="0"/>
+          <a:chExt cy="0" cx="0"/>
+        </a:xfrm>
+      </p:grpSpPr>
+      <p:sp>
+        <p:nvSpPr>
+          <p:cNvPr id="63" name="Shape 63"/>
+          <p:cNvSpPr/>
+          <p:nvPr>
+            <p:ph idx="2" type="sldImg"/>
+          </p:nvPr>
+        </p:nvSpPr>
+        <p:spPr>
+          <a:xfrm>
+            <a:off y="685800" x="1143225"/>
+            <a:ext cy="3429000" cx="4572299"/>
+          </a:xfrm>
+          <a:custGeom>
+            <a:pathLst>
+              <a:path w="120000" extrusionOk="0" h="120000">
+                <a:moveTo>
+                  <a:pt y="0" x="0"/>
+                </a:moveTo>
+                <a:lnTo>
+                  <a:pt y="0" x="120000"/>
+                </a:lnTo>
+                <a:lnTo>
+                  <a:pt y="120000" x="120000"/>
+                </a:lnTo>
+                <a:lnTo>
+                  <a:pt y="120000" x="0"/>
+                </a:lnTo>
+                <a:close/>
+              </a:path>
+            </a:pathLst>
+          </a:custGeom>
+        </p:spPr>
+      </p:sp>
+      <p:sp>
+        <p:nvSpPr>
+          <p:cNvPr id="64" name="Shape 64"/>
+          <p:cNvSpPr txBox="1"/>
+          <p:nvPr>
+            <p:ph idx="1" type="body"/>
+          </p:nvPr>
+        </p:nvSpPr>
+        <p:spPr>
+          <a:xfrm>
+            <a:off y="4343400" x="685800"/>
+            <a:ext cy="4114800" cx="5486399"/>
+          </a:xfrm>
+          <a:prstGeom prst="rect">
+            <a:avLst/>
+          </a:prstGeom>
+        </p:spPr>
+        <p:txBody>
+          <a:bodyPr bIns="91425" rIns="91425" lIns="91425" tIns="91425" anchor="t" anchorCtr="0">
+            <a:noAutofit/>
+          </a:bodyPr>
+          <a:lstStyle/>
+          <a:p/>
+        </p:txBody>
+      </p:sp>
+    </p:spTree>
+  </p:cSld>
+  <p:clrMapOvr>
+    <a:masterClrMapping/>
+  </p:clrMapOvr>
+</p:notes>
+</file>
+
+<file path=ppt/notesSlides/notesSlide7.xml><?xml version="1.0" encoding="utf-8"?>
+<p:notes xmlns:a="http://schemas.openxmlformats.org/drawingml/2006/main" xmlns:r="http://schemas.openxmlformats.org/officeDocument/2006/relationships" xmlns:mc="http://schemas.openxmlformats.org/markup-compatibility/2006" xmlns:mv="urn:schemas-microsoft-com:mac:vml" xmlns:p="http://schemas.openxmlformats.org/presentationml/2006/main" xmlns:c="http://schemas.openxmlformats.org/drawingml/2006/chart" xmlns:dgm="http://schemas.openxmlformats.org/drawingml/2006/diagram" xmlns:o="urn:schemas-microsoft-com:office:office" xmlns:v="urn:schemas-microsoft-com:vml" xmlns:pvml="urn:schemas-microsoft-com:office:powerpoint" xmlns:com="http://schemas.openxmlformats.org/drawingml/2006/compatibility" xmlns:p14="http://schemas.microsoft.com/office/powerpoint/2010/main" showMasterSp="0" showMasterPhAnim="0">
+  <p:cSld>
+    <p:spTree>
+      <p:nvGrpSpPr>
+        <p:cNvPr id="68" name="Shape 68"/>
+        <p:cNvGrpSpPr/>
+        <p:nvPr/>
+      </p:nvGrpSpPr>
+      <p:grpSpPr>
+        <a:xfrm>
+          <a:off y="0" x="0"/>
+          <a:ext cy="0" cx="0"/>
+          <a:chOff y="0" x="0"/>
+          <a:chExt cy="0" cx="0"/>
+        </a:xfrm>
+      </p:grpSpPr>
+      <p:sp>
+        <p:nvSpPr>
+          <p:cNvPr id="69" name="Shape 69"/>
+          <p:cNvSpPr/>
+          <p:nvPr>
+            <p:ph idx="2" type="sldImg"/>
+          </p:nvPr>
+        </p:nvSpPr>
+        <p:spPr>
+          <a:xfrm>
+            <a:off y="685800" x="1143225"/>
+            <a:ext cy="3429000" cx="4572299"/>
+          </a:xfrm>
+          <a:custGeom>
+            <a:pathLst>
+              <a:path w="120000" extrusionOk="0" h="120000">
+                <a:moveTo>
+                  <a:pt y="0" x="0"/>
+                </a:moveTo>
+                <a:lnTo>
+                  <a:pt y="0" x="120000"/>
+                </a:lnTo>
+                <a:lnTo>
+                  <a:pt y="120000" x="120000"/>
+                </a:lnTo>
+                <a:lnTo>
+                  <a:pt y="120000" x="0"/>
+                </a:lnTo>
+                <a:close/>
+              </a:path>
+            </a:pathLst>
+          </a:custGeom>
+        </p:spPr>
+      </p:sp>
+      <p:sp>
+        <p:nvSpPr>
+          <p:cNvPr id="70" name="Shape 70"/>
           <p:cNvSpPr txBox="1"/>
           <p:nvPr>
             <p:ph idx="1" type="body"/>
@@ -3714,8 +3884,8 @@
         </p:nvSpPr>
         <p:spPr>
           <a:xfrm>
-            <a:off y="3181350" x="4267200"/>
-            <a:ext cy="495300" cx="609600"/>
+            <a:off y="1600200" x="457200"/>
+            <a:ext cy="3114675" cx="3810000"/>
           </a:xfrm>
           <a:prstGeom prst="rect">
             <a:avLst/>
@@ -3787,6 +3957,470 @@
             </a:pPr>
             <a:r>
               <a:rPr lang="en"/>
+              <a:t>Drawing</a:t>
+            </a:r>
+          </a:p>
+        </p:txBody>
+      </p:sp>
+      <p:sp>
+        <p:nvSpPr>
+          <p:cNvPr id="49" name="Shape 49"/>
+          <p:cNvSpPr txBox="1"/>
+          <p:nvPr>
+            <p:ph idx="1" type="body"/>
+          </p:nvPr>
+        </p:nvSpPr>
+        <p:spPr>
+          <a:xfrm>
+            <a:off y="1600200" x="457200"/>
+            <a:ext cy="4967700" cx="8229600"/>
+          </a:xfrm>
+          <a:prstGeom prst="rect">
+            <a:avLst/>
+          </a:prstGeom>
+        </p:spPr>
+        <p:txBody>
+          <a:bodyPr bIns="91425" rIns="91425" lIns="91425" tIns="91425" anchor="t" anchorCtr="0">
+            <a:noAutofit/>
+          </a:bodyPr>
+          <a:lstStyle/>
+          <a:p/>
+        </p:txBody>
+      </p:sp>
+      <p:sp>
+        <p:nvSpPr>
+          <p:cNvPr id="50" name="Shape 50"/>
+          <p:cNvSpPr/>
+          <p:nvPr/>
+        </p:nvSpPr>
+        <p:spPr>
+          <a:xfrm>
+            <a:off y="1770125" x="570700"/>
+            <a:ext cy="1634700" cx="3114600"/>
+          </a:xfrm>
+          <a:prstGeom prst="rect">
+            <a:avLst/>
+          </a:prstGeom>
+          <a:solidFill>
+            <a:schemeClr val="lt2"/>
+          </a:solidFill>
+          <a:ln w="19050" cap="flat">
+            <a:solidFill>
+              <a:schemeClr val="dk2"/>
+            </a:solidFill>
+            <a:prstDash val="solid"/>
+            <a:round/>
+            <a:headEnd w="med" len="med" type="none"/>
+            <a:tailEnd w="med" len="med" type="none"/>
+          </a:ln>
+        </p:spPr>
+        <p:txBody>
+          <a:bodyPr bIns="91425" rIns="91425" lIns="91425" tIns="91425" anchor="ctr" anchorCtr="0">
+            <a:noAutofit/>
+          </a:bodyPr>
+          <a:lstStyle/>
+          <a:p/>
+        </p:txBody>
+      </p:sp>
+      <p:sp>
+        <p:nvSpPr>
+          <p:cNvPr id="51" name="Shape 51"/>
+          <p:cNvSpPr/>
+          <p:nvPr/>
+        </p:nvSpPr>
+        <p:spPr>
+          <a:xfrm>
+            <a:off y="2582625" x="2727725"/>
+            <a:ext cy="1983000" cx="1518600"/>
+          </a:xfrm>
+          <a:prstGeom prst="curvedDownArrow">
+            <a:avLst>
+              <a:gd fmla="val 25000" name="adj1"/>
+              <a:gd fmla="val 50000" name="adj2"/>
+              <a:gd fmla="val 25000" name="adj3"/>
+            </a:avLst>
+          </a:prstGeom>
+          <a:solidFill>
+            <a:schemeClr val="lt2"/>
+          </a:solidFill>
+          <a:ln w="19050" cap="flat">
+            <a:solidFill>
+              <a:schemeClr val="dk2"/>
+            </a:solidFill>
+            <a:prstDash val="solid"/>
+            <a:round/>
+            <a:headEnd w="med" len="med" type="none"/>
+            <a:tailEnd w="med" len="med" type="none"/>
+          </a:ln>
+        </p:spPr>
+        <p:txBody>
+          <a:bodyPr bIns="91425" rIns="91425" lIns="91425" tIns="91425" anchor="ctr" anchorCtr="0">
+            <a:noAutofit/>
+          </a:bodyPr>
+          <a:lstStyle/>
+          <a:p/>
+        </p:txBody>
+      </p:sp>
+      <p:sp>
+        <p:nvSpPr>
+          <p:cNvPr id="52" name="Shape 52"/>
+          <p:cNvSpPr/>
+          <p:nvPr/>
+        </p:nvSpPr>
+        <p:spPr>
+          <a:xfrm>
+            <a:off y="2514925" x="3366125"/>
+            <a:ext cy="1431600" cx="1992600"/>
+          </a:xfrm>
+          <a:prstGeom prst="ellipse">
+            <a:avLst/>
+          </a:prstGeom>
+          <a:solidFill>
+            <a:srgbClr val="FF9900"/>
+          </a:solidFill>
+          <a:ln w="19050" cap="flat">
+            <a:solidFill>
+              <a:schemeClr val="dk2"/>
+            </a:solidFill>
+            <a:prstDash val="solid"/>
+            <a:round/>
+            <a:headEnd w="med" len="med" type="none"/>
+            <a:tailEnd w="med" len="med" type="none"/>
+          </a:ln>
+        </p:spPr>
+        <p:txBody>
+          <a:bodyPr bIns="91425" rIns="91425" lIns="91425" tIns="91425" anchor="ctr" anchorCtr="0">
+            <a:noAutofit/>
+          </a:bodyPr>
+          <a:lstStyle/>
+          <a:p/>
+        </p:txBody>
+      </p:sp>
+      <p:cxnSp>
+        <p:nvCxnSpPr>
+          <p:cNvPr id="53" name="Shape 53"/>
+          <p:cNvCxnSpPr/>
+          <p:nvPr/>
+        </p:nvCxnSpPr>
+        <p:spPr>
+          <a:xfrm rot="10800000" flipH="1">
+            <a:off y="2195699" x="1112375"/>
+            <a:ext cy="2350500" cx="5561699"/>
+          </a:xfrm>
+          <a:prstGeom prst="straightConnector1">
+            <a:avLst/>
+          </a:prstGeom>
+          <a:noFill/>
+          <a:ln w="19050" cap="flat">
+            <a:solidFill>
+              <a:schemeClr val="dk2"/>
+            </a:solidFill>
+            <a:prstDash val="solid"/>
+            <a:round/>
+            <a:headEnd w="lg" len="lg" type="none"/>
+            <a:tailEnd w="lg" len="lg" type="none"/>
+          </a:ln>
+        </p:spPr>
+      </p:cxnSp>
+    </p:spTree>
+  </p:cSld>
+  <p:clrMapOvr>
+    <a:masterClrMapping/>
+  </p:clrMapOvr>
+  <p:transition spd="slow">
+    <p:cut/>
+  </p:transition>
+</p:sld>
+</file>
+
+<file path=ppt/slides/slide6.xml><?xml version="1.0" encoding="utf-8"?>
+<p:sld xmlns:a="http://schemas.openxmlformats.org/drawingml/2006/main" xmlns:r="http://schemas.openxmlformats.org/officeDocument/2006/relationships" xmlns:mc="http://schemas.openxmlformats.org/markup-compatibility/2006" xmlns:mv="urn:schemas-microsoft-com:mac:vml" xmlns:p="http://schemas.openxmlformats.org/presentationml/2006/main" xmlns:c="http://schemas.openxmlformats.org/drawingml/2006/chart" xmlns:dgm="http://schemas.openxmlformats.org/drawingml/2006/diagram" xmlns:o="urn:schemas-microsoft-com:office:office" xmlns:v="urn:schemas-microsoft-com:vml" xmlns:pvml="urn:schemas-microsoft-com:office:powerpoint" xmlns:com="http://schemas.openxmlformats.org/drawingml/2006/compatibility" xmlns:p14="http://schemas.microsoft.com/office/powerpoint/2010/main">
+  <p:cSld>
+    <p:spTree>
+      <p:nvGrpSpPr>
+        <p:cNvPr id="57" name="Shape 57"/>
+        <p:cNvGrpSpPr/>
+        <p:nvPr/>
+      </p:nvGrpSpPr>
+      <p:grpSpPr>
+        <a:xfrm>
+          <a:off y="0" x="0"/>
+          <a:ext cy="0" cx="0"/>
+          <a:chOff y="0" x="0"/>
+          <a:chExt cy="0" cx="0"/>
+        </a:xfrm>
+      </p:grpSpPr>
+      <p:sp>
+        <p:nvSpPr>
+          <p:cNvPr id="58" name="Shape 58"/>
+          <p:cNvSpPr txBox="1"/>
+          <p:nvPr>
+            <p:ph type="title"/>
+          </p:nvPr>
+        </p:nvSpPr>
+        <p:spPr>
+          <a:xfrm>
+            <a:off y="274637" x="457200"/>
+            <a:ext cy="1143000" cx="8229600"/>
+          </a:xfrm>
+          <a:prstGeom prst="rect">
+            <a:avLst/>
+          </a:prstGeom>
+          <a:solidFill>
+            <a:srgbClr val="990000"/>
+          </a:solidFill>
+        </p:spPr>
+        <p:txBody>
+          <a:bodyPr bIns="91425" rIns="91425" lIns="91425" tIns="91425" anchor="b" anchorCtr="0">
+            <a:noAutofit/>
+          </a:bodyPr>
+          <a:lstStyle/>
+          <a:p>
+            <a:pPr>
+              <a:buNone/>
+            </a:pPr>
+            <a:r>
+              <a:rPr lang="en"/>
+              <a:t>table &amp; text box</a:t>
+            </a:r>
+          </a:p>
+        </p:txBody>
+      </p:sp>
+      <p:sp>
+        <p:nvSpPr>
+          <p:cNvPr id="59" name="Shape 59"/>
+          <p:cNvSpPr txBox="1"/>
+          <p:nvPr>
+            <p:ph idx="1" type="body"/>
+          </p:nvPr>
+        </p:nvSpPr>
+        <p:spPr>
+          <a:xfrm>
+            <a:off y="1600200" x="457200"/>
+            <a:ext cy="4967700" cx="8229600"/>
+          </a:xfrm>
+          <a:prstGeom prst="rect">
+            <a:avLst/>
+          </a:prstGeom>
+        </p:spPr>
+        <p:txBody>
+          <a:bodyPr bIns="91425" rIns="91425" lIns="91425" tIns="91425" anchor="t" anchorCtr="0">
+            <a:noAutofit/>
+          </a:bodyPr>
+          <a:lstStyle/>
+          <a:p/>
+        </p:txBody>
+      </p:sp>
+      <p:graphicFrame>
+        <p:nvGraphicFramePr>
+          <p:cNvPr id="60" name="Shape 60"/>
+          <p:cNvGraphicFramePr/>
+          <p:nvPr/>
+        </p:nvGraphicFramePr>
+        <p:xfrm>
+          <a:off y="1784350" x="836425"/>
+          <a:ext cy="3000000" cx="3000000"/>
+        </p:xfrm>
+        <a:graphic>
+          <a:graphicData uri="http://schemas.openxmlformats.org/drawingml/2006/table">
+            <a:tbl>
+              <a:tblPr>
+                <a:noFill/>
+                <a:tableStyleId>{95807ECC-F34B-437C-915E-4432C9910F51}</a:tableStyleId>
+              </a:tblPr>
+              <a:tblGrid>
+                <a:gridCol w="2413000"/>
+                <a:gridCol w="2413000"/>
+                <a:gridCol w="2413000"/>
+              </a:tblGrid>
+              <a:tr h="381000">
+                <a:tc>
+                  <a:txBody>
+                    <a:bodyPr>
+                      <a:noAutofit/>
+                    </a:bodyPr>
+                    <a:lstStyle/>
+                    <a:p>
+                      <a:pPr>
+                        <a:buNone/>
+                      </a:pPr>
+                      <a:r>
+                        <a:rPr lang="en"/>
+                        <a:t>tablllle</a:t>
+                      </a:r>
+                    </a:p>
+                  </a:txBody>
+                  <a:tcPr marR="91425" marB="91425" marT="91425" marL="91425"/>
+                </a:tc>
+                <a:tc>
+                  <a:txBody>
+                    <a:bodyPr>
+                      <a:noAutofit/>
+                    </a:bodyPr>
+                    <a:lstStyle/>
+                    <a:p>
+                      <a:pPr>
+                        <a:buNone/>
+                      </a:pPr>
+                      <a:r>
+                        <a:rPr lang="en"/>
+                        <a:t>2</a:t>
+                      </a:r>
+                    </a:p>
+                  </a:txBody>
+                  <a:tcPr marR="91425" marB="91425" marT="91425" marL="91425"/>
+                </a:tc>
+                <a:tc>
+                  <a:txBody>
+                    <a:bodyPr>
+                      <a:noAutofit/>
+                    </a:bodyPr>
+                    <a:lstStyle/>
+                    <a:p>
+                      <a:pPr>
+                        <a:buNone/>
+                      </a:pPr>
+                      <a:r>
+                        <a:rPr lang="en"/>
+                        <a:t>3</a:t>
+                      </a:r>
+                    </a:p>
+                  </a:txBody>
+                  <a:tcPr marR="91425" marB="91425" marT="91425" marL="91425"/>
+                </a:tc>
+              </a:tr>
+              <a:tr h="381000">
+                <a:tc>
+                  <a:txBody>
+                    <a:bodyPr>
+                      <a:noAutofit/>
+                    </a:bodyPr>
+                    <a:lstStyle/>
+                    <a:p/>
+                  </a:txBody>
+                  <a:tcPr marR="91425" marB="91425" marT="91425" marL="91425"/>
+                </a:tc>
+                <a:tc>
+                  <a:txBody>
+                    <a:bodyPr>
+                      <a:noAutofit/>
+                    </a:bodyPr>
+                    <a:lstStyle/>
+                    <a:p/>
+                  </a:txBody>
+                  <a:tcPr marR="91425" marB="91425" marT="91425" marL="91425"/>
+                </a:tc>
+                <a:tc>
+                  <a:txBody>
+                    <a:bodyPr>
+                      <a:noAutofit/>
+                    </a:bodyPr>
+                    <a:lstStyle/>
+                    <a:p>
+                      <a:pPr>
+                        <a:buNone/>
+                      </a:pPr>
+                      <a:r>
+                        <a:rPr lang="en"/>
+                        <a:t>6</a:t>
+                      </a:r>
+                    </a:p>
+                  </a:txBody>
+                  <a:tcPr marR="91425" marB="91425" marT="91425" marL="91425"/>
+                </a:tc>
+              </a:tr>
+            </a:tbl>
+          </a:graphicData>
+        </a:graphic>
+      </p:graphicFrame>
+      <p:sp>
+        <p:nvSpPr>
+          <p:cNvPr id="61" name="Shape 61"/>
+          <p:cNvSpPr txBox="1"/>
+          <p:nvPr/>
+        </p:nvSpPr>
+        <p:spPr>
+          <a:xfrm>
+            <a:off y="2921175" x="3056600"/>
+            <a:ext cy="889800" cx="986700"/>
+          </a:xfrm>
+          <a:prstGeom prst="rect">
+            <a:avLst/>
+          </a:prstGeom>
+          <a:noFill/>
+        </p:spPr>
+        <p:txBody>
+          <a:bodyPr bIns="91425" rIns="91425" lIns="91425" tIns="91425" anchor="t" anchorCtr="0">
+            <a:noAutofit/>
+          </a:bodyPr>
+          <a:lstStyle/>
+          <a:p>
+            <a:pPr>
+              <a:buNone/>
+            </a:pPr>
+            <a:r>
+              <a:rPr lang="en"/>
+              <a:t>text box</a:t>
+            </a:r>
+          </a:p>
+        </p:txBody>
+      </p:sp>
+    </p:spTree>
+  </p:cSld>
+  <p:clrMapOvr>
+    <a:masterClrMapping/>
+  </p:clrMapOvr>
+  <p:transition spd="slow">
+    <p:cut/>
+  </p:transition>
+</p:sld>
+</file>
+
+<file path=ppt/slides/slide7.xml><?xml version="1.0" encoding="utf-8"?>
+<p:sld xmlns:a="http://schemas.openxmlformats.org/drawingml/2006/main" xmlns:r="http://schemas.openxmlformats.org/officeDocument/2006/relationships" xmlns:mc="http://schemas.openxmlformats.org/markup-compatibility/2006" xmlns:mv="urn:schemas-microsoft-com:mac:vml" xmlns:p="http://schemas.openxmlformats.org/presentationml/2006/main" xmlns:c="http://schemas.openxmlformats.org/drawingml/2006/chart" xmlns:dgm="http://schemas.openxmlformats.org/drawingml/2006/diagram" xmlns:o="urn:schemas-microsoft-com:office:office" xmlns:v="urn:schemas-microsoft-com:vml" xmlns:pvml="urn:schemas-microsoft-com:office:powerpoint" xmlns:com="http://schemas.openxmlformats.org/drawingml/2006/compatibility" xmlns:p14="http://schemas.microsoft.com/office/powerpoint/2010/main">
+  <p:cSld>
+    <p:spTree>
+      <p:nvGrpSpPr>
+        <p:cNvPr id="65" name="Shape 65"/>
+        <p:cNvGrpSpPr/>
+        <p:nvPr/>
+      </p:nvGrpSpPr>
+      <p:grpSpPr>
+        <a:xfrm>
+          <a:off y="0" x="0"/>
+          <a:ext cy="0" cx="0"/>
+          <a:chOff y="0" x="0"/>
+          <a:chExt cy="0" cx="0"/>
+        </a:xfrm>
+      </p:grpSpPr>
+      <p:sp>
+        <p:nvSpPr>
+          <p:cNvPr id="66" name="Shape 66"/>
+          <p:cNvSpPr txBox="1"/>
+          <p:nvPr>
+            <p:ph type="title"/>
+          </p:nvPr>
+        </p:nvSpPr>
+        <p:spPr>
+          <a:xfrm>
+            <a:off y="274637" x="457200"/>
+            <a:ext cy="1143000" cx="8229600"/>
+          </a:xfrm>
+          <a:prstGeom prst="rect">
+            <a:avLst/>
+          </a:prstGeom>
+        </p:spPr>
+        <p:txBody>
+          <a:bodyPr bIns="91425" rIns="91425" lIns="91425" tIns="91425" anchor="b" anchorCtr="0">
+            <a:noAutofit/>
+          </a:bodyPr>
+          <a:lstStyle/>
+          <a:p>
+            <a:pPr>
+              <a:buNone/>
+            </a:pPr>
+            <a:r>
+              <a:rPr lang="en"/>
               <a:t>Inside transitions</a:t>
             </a:r>
           </a:p>
@@ -3794,7 +4428,7 @@
       </p:sp>
       <p:sp>
         <p:nvSpPr>
-          <p:cNvPr id="49" name="Shape 49"/>
+          <p:cNvPr id="67" name="Shape 67"/>
           <p:cNvSpPr txBox="1"/>
           <p:nvPr>
             <p:ph idx="1" type="body"/>
@@ -3867,7 +4501,7 @@
                                           </p:stCondLst>
                                         </p:cTn>
                                         <p:tgtEl>
-                                          <p:spTgt spid="49"/>
+                                          <p:spTgt spid="67"/>
                                         </p:tgtEl>
                                         <p:attrNameLst>
                                           <p:attrName>style.visibility</p:attrName>
@@ -3881,7 +4515,7 @@
                                       <p:cBhvr>
                                         <p:cTn dur="0"/>
                                         <p:tgtEl>
-                                          <p:spTgt spid="49"/>
+                                          <p:spTgt spid="67"/>
                                         </p:tgtEl>
                                       </p:cBhvr>
                                     </p:animEffect>
@@ -3920,6 +4554,560 @@
 </file>
 
 <file path=ppt/theme/theme1.xml><?xml version="1.0" encoding="utf-8"?>
+<a:theme xmlns:a="http://schemas.openxmlformats.org/drawingml/2006/main" xmlns:r="http://schemas.openxmlformats.org/officeDocument/2006/relationships">
+  <a:themeElements>
+    <a:clrScheme name="Custom 347">
+      <a:dk1>
+        <a:srgbClr val="000000"/>
+      </a:dk1>
+      <a:lt1>
+        <a:srgbClr val="FFFFFF"/>
+      </a:lt1>
+      <a:dk2>
+        <a:srgbClr val="666666"/>
+      </a:dk2>
+      <a:lt2>
+        <a:srgbClr val="CCCCCC"/>
+      </a:lt2>
+      <a:accent1>
+        <a:srgbClr val="3A81BA"/>
+      </a:accent1>
+      <a:accent2>
+        <a:srgbClr val="D89F39"/>
+      </a:accent2>
+      <a:accent3>
+        <a:srgbClr val="8BAB42"/>
+      </a:accent3>
+      <a:accent4>
+        <a:srgbClr val="57A7B5"/>
+      </a:accent4>
+      <a:accent5>
+        <a:srgbClr val="8B81D2"/>
+      </a:accent5>
+      <a:accent6>
+        <a:srgbClr val="963334"/>
+      </a:accent6>
+      <a:hlink>
+        <a:srgbClr val="1155CC"/>
+      </a:hlink>
+      <a:folHlink>
+        <a:srgbClr val="6611CC"/>
+      </a:folHlink>
+    </a:clrScheme>
+    <a:fontScheme name="Office">
+      <a:majorFont>
+        <a:latin typeface="Arial"/>
+        <a:ea typeface=""/>
+        <a:cs typeface=""/>
+        <a:font typeface="ＭＳ Ｐゴシック" script="Jpan"/>
+        <a:font typeface="맑은 고딕" script="Hang"/>
+        <a:font typeface="宋体" script="Hans"/>
+        <a:font typeface="新細明體" script="Hant"/>
+        <a:font typeface="Times New Roman" script="Arab"/>
+        <a:font typeface="Times New Roman" script="Hebr"/>
+        <a:font typeface="Angsana New" script="Thai"/>
+        <a:font typeface="Nyala" script="Ethi"/>
+        <a:font typeface="Vrinda" script="Beng"/>
+        <a:font typeface="Shruti" script="Gujr"/>
+        <a:font typeface="MoolBoran" script="Khmr"/>
+        <a:font typeface="Tunga" script="Knda"/>
+        <a:font typeface="Raavi" script="Guru"/>
+        <a:font typeface="Euphemia" script="Cans"/>
+        <a:font typeface="Plantagenet Cherokee" script="Cher"/>
+        <a:font typeface="Microsoft Yi Baiti" script="Yiii"/>
+        <a:font typeface="Microsoft Himalaya" script="Tibt"/>
+        <a:font typeface="MV Boli" script="Thaa"/>
+        <a:font typeface="Mangal" script="Deva"/>
+        <a:font typeface="Gautami" script="Telu"/>
+        <a:font typeface="Latha" script="Taml"/>
+        <a:font typeface="Estrangelo Edessa" script="Syrc"/>
+        <a:font typeface="Kalinga" script="Orya"/>
+        <a:font typeface="Kartika" script="Mlym"/>
+        <a:font typeface="DokChampa" script="Laoo"/>
+        <a:font typeface="Iskoola Pota" script="Sinh"/>
+        <a:font typeface="Mongolian Baiti" script="Mong"/>
+        <a:font typeface="Times New Roman" script="Viet"/>
+        <a:font typeface="Microsoft Uighur" script="Uigh"/>
+      </a:majorFont>
+      <a:minorFont>
+        <a:latin typeface="Arial"/>
+        <a:ea typeface=""/>
+        <a:cs typeface=""/>
+        <a:font typeface="ＭＳ Ｐゴシック" script="Jpan"/>
+        <a:font typeface="맑은 고딕" script="Hang"/>
+        <a:font typeface="宋体" script="Hans"/>
+        <a:font typeface="新細明體" script="Hant"/>
+        <a:font typeface="Arial" script="Arab"/>
+        <a:font typeface="Arial" script="Hebr"/>
+        <a:font typeface="Cordia New" script="Thai"/>
+        <a:font typeface="Nyala" script="Ethi"/>
+        <a:font typeface="Vrinda" script="Beng"/>
+        <a:font typeface="Shruti" script="Gujr"/>
+        <a:font typeface="DaunPenh" script="Khmr"/>
+        <a:font typeface="Tunga" script="Knda"/>
+        <a:font typeface="Raavi" script="Guru"/>
+        <a:font typeface="Euphemia" script="Cans"/>
+        <a:font typeface="Plantagenet Cherokee" script="Cher"/>
+        <a:font typeface="Microsoft Yi Baiti" script="Yiii"/>
+        <a:font typeface="Microsoft Himalaya" script="Tibt"/>
+        <a:font typeface="MV Boli" script="Thaa"/>
+        <a:font typeface="Mangal" script="Deva"/>
+        <a:font typeface="Gautami" script="Telu"/>
+        <a:font typeface="Latha" script="Taml"/>
+        <a:font typeface="Estrangelo Edessa" script="Syrc"/>
+        <a:font typeface="Kalinga" script="Orya"/>
+        <a:font typeface="Kartika" script="Mlym"/>
+        <a:font typeface="DokChampa" script="Laoo"/>
+        <a:font typeface="Iskoola Pota" script="Sinh"/>
+        <a:font typeface="Mongolian Baiti" script="Mong"/>
+        <a:font typeface="Arial" script="Viet"/>
+        <a:font typeface="Microsoft Uighur" script="Uigh"/>
+      </a:minorFont>
+    </a:fontScheme>
+    <a:fmtScheme name="Office">
+      <a:fillStyleLst>
+        <a:solidFill>
+          <a:schemeClr val="phClr"/>
+        </a:solidFill>
+        <a:gradFill rotWithShape="1">
+          <a:gsLst>
+            <a:gs pos="0">
+              <a:schemeClr val="phClr">
+                <a:tint val="50000"/>
+                <a:satMod val="300000"/>
+              </a:schemeClr>
+            </a:gs>
+            <a:gs pos="35000">
+              <a:schemeClr val="phClr">
+                <a:tint val="37000"/>
+                <a:satMod val="300000"/>
+              </a:schemeClr>
+            </a:gs>
+            <a:gs pos="100000">
+              <a:schemeClr val="phClr">
+                <a:tint val="15000"/>
+                <a:satMod val="350000"/>
+              </a:schemeClr>
+            </a:gs>
+          </a:gsLst>
+          <a:lin ang="16200000" scaled="1"/>
+        </a:gradFill>
+        <a:gradFill rotWithShape="1">
+          <a:gsLst>
+            <a:gs pos="0">
+              <a:schemeClr val="phClr">
+                <a:tint val="100000"/>
+                <a:shade val="100000"/>
+                <a:satMod val="130000"/>
+              </a:schemeClr>
+            </a:gs>
+            <a:gs pos="100000">
+              <a:schemeClr val="phClr">
+                <a:tint val="50000"/>
+                <a:shade val="100000"/>
+                <a:satMod val="350000"/>
+              </a:schemeClr>
+            </a:gs>
+          </a:gsLst>
+          <a:lin ang="16200000" scaled="0"/>
+        </a:gradFill>
+      </a:fillStyleLst>
+      <a:lnStyleLst>
+        <a:ln w="9525" algn="ctr" cap="flat" cmpd="sng">
+          <a:solidFill>
+            <a:schemeClr val="phClr">
+              <a:shade val="95000"/>
+              <a:satMod val="105000"/>
+            </a:schemeClr>
+          </a:solidFill>
+          <a:prstDash val="solid"/>
+        </a:ln>
+        <a:ln w="25400" algn="ctr" cap="flat" cmpd="sng">
+          <a:solidFill>
+            <a:schemeClr val="phClr"/>
+          </a:solidFill>
+          <a:prstDash val="solid"/>
+        </a:ln>
+        <a:ln w="38100" algn="ctr" cap="flat" cmpd="sng">
+          <a:solidFill>
+            <a:schemeClr val="phClr"/>
+          </a:solidFill>
+          <a:prstDash val="solid"/>
+        </a:ln>
+      </a:lnStyleLst>
+      <a:effectStyleLst>
+        <a:effectStyle>
+          <a:effectLst>
+            <a:outerShdw rotWithShape="0" dir="5400000" blurRad="40000" dist="20000">
+              <a:srgbClr val="000000">
+                <a:alpha val="38000"/>
+              </a:srgbClr>
+            </a:outerShdw>
+          </a:effectLst>
+        </a:effectStyle>
+        <a:effectStyle>
+          <a:effectLst>
+            <a:outerShdw rotWithShape="0" dir="5400000" blurRad="40000" dist="23000">
+              <a:srgbClr val="000000">
+                <a:alpha val="35000"/>
+              </a:srgbClr>
+            </a:outerShdw>
+          </a:effectLst>
+        </a:effectStyle>
+        <a:effectStyle>
+          <a:effectLst>
+            <a:outerShdw rotWithShape="0" dir="5400000" blurRad="40000" dist="23000">
+              <a:srgbClr val="000000">
+                <a:alpha val="35000"/>
+              </a:srgbClr>
+            </a:outerShdw>
+          </a:effectLst>
+          <a:scene3d>
+            <a:camera prst="orthographicFront">
+              <a:rot rev="0" lon="0" lat="0"/>
+            </a:camera>
+            <a:lightRig dir="t" rig="threePt">
+              <a:rot rev="1200000" lon="0" lat="0"/>
+            </a:lightRig>
+          </a:scene3d>
+          <a:sp3d>
+            <a:bevelT w="63500" h="25400"/>
+          </a:sp3d>
+        </a:effectStyle>
+      </a:effectStyleLst>
+      <a:bgFillStyleLst>
+        <a:solidFill>
+          <a:schemeClr val="phClr"/>
+        </a:solidFill>
+        <a:gradFill rotWithShape="1">
+          <a:gsLst>
+            <a:gs pos="0">
+              <a:schemeClr val="phClr">
+                <a:tint val="40000"/>
+                <a:satMod val="350000"/>
+              </a:schemeClr>
+            </a:gs>
+            <a:gs pos="40000">
+              <a:schemeClr val="phClr">
+                <a:tint val="45000"/>
+                <a:shade val="99000"/>
+                <a:satMod val="350000"/>
+              </a:schemeClr>
+            </a:gs>
+            <a:gs pos="100000">
+              <a:schemeClr val="phClr">
+                <a:shade val="20000"/>
+                <a:satMod val="255000"/>
+              </a:schemeClr>
+            </a:gs>
+          </a:gsLst>
+          <a:path path="circle">
+            <a:fillToRect t="-80000" b="180000" r="50000" l="50000"/>
+          </a:path>
+        </a:gradFill>
+        <a:gradFill rotWithShape="1">
+          <a:gsLst>
+            <a:gs pos="0">
+              <a:schemeClr val="phClr">
+                <a:tint val="80000"/>
+                <a:satMod val="300000"/>
+              </a:schemeClr>
+            </a:gs>
+            <a:gs pos="100000">
+              <a:schemeClr val="phClr">
+                <a:shade val="30000"/>
+                <a:satMod val="200000"/>
+              </a:schemeClr>
+            </a:gs>
+          </a:gsLst>
+          <a:path path="circle">
+            <a:fillToRect t="50000" b="50000" r="50000" l="50000"/>
+          </a:path>
+        </a:gradFill>
+      </a:bgFillStyleLst>
+    </a:fmtScheme>
+  </a:themeElements>
+</a:theme>
+</file>
+
+<file path=ppt/theme/theme2.xml><?xml version="1.0" encoding="utf-8"?>
+<a:theme xmlns:a="http://schemas.openxmlformats.org/drawingml/2006/main" xmlns:r="http://schemas.openxmlformats.org/officeDocument/2006/relationships">
+  <a:themeElements>
+    <a:clrScheme name="Default">
+      <a:dk1>
+        <a:srgbClr val="000000"/>
+      </a:dk1>
+      <a:lt1>
+        <a:srgbClr val="FFFFFF"/>
+      </a:lt1>
+      <a:dk2>
+        <a:srgbClr val="158158"/>
+      </a:dk2>
+      <a:lt2>
+        <a:srgbClr val="F3F3F3"/>
+      </a:lt2>
+      <a:accent1>
+        <a:srgbClr val="058DC7"/>
+      </a:accent1>
+      <a:accent2>
+        <a:srgbClr val="50B432"/>
+      </a:accent2>
+      <a:accent3>
+        <a:srgbClr val="ED561B"/>
+      </a:accent3>
+      <a:accent4>
+        <a:srgbClr val="EDEF00"/>
+      </a:accent4>
+      <a:accent5>
+        <a:srgbClr val="24CBE5"/>
+      </a:accent5>
+      <a:accent6>
+        <a:srgbClr val="64E572"/>
+      </a:accent6>
+      <a:hlink>
+        <a:srgbClr val="2200CC"/>
+      </a:hlink>
+      <a:folHlink>
+        <a:srgbClr val="551A8B"/>
+      </a:folHlink>
+    </a:clrScheme>
+    <a:fontScheme name="Office">
+      <a:majorFont>
+        <a:latin typeface="Arial"/>
+        <a:ea typeface=""/>
+        <a:cs typeface=""/>
+        <a:font typeface="ＭＳ Ｐゴシック" script="Jpan"/>
+        <a:font typeface="맑은 고딕" script="Hang"/>
+        <a:font typeface="宋体" script="Hans"/>
+        <a:font typeface="新細明體" script="Hant"/>
+        <a:font typeface="Times New Roman" script="Arab"/>
+        <a:font typeface="Times New Roman" script="Hebr"/>
+        <a:font typeface="Angsana New" script="Thai"/>
+        <a:font typeface="Nyala" script="Ethi"/>
+        <a:font typeface="Vrinda" script="Beng"/>
+        <a:font typeface="Shruti" script="Gujr"/>
+        <a:font typeface="MoolBoran" script="Khmr"/>
+        <a:font typeface="Tunga" script="Knda"/>
+        <a:font typeface="Raavi" script="Guru"/>
+        <a:font typeface="Euphemia" script="Cans"/>
+        <a:font typeface="Plantagenet Cherokee" script="Cher"/>
+        <a:font typeface="Microsoft Yi Baiti" script="Yiii"/>
+        <a:font typeface="Microsoft Himalaya" script="Tibt"/>
+        <a:font typeface="MV Boli" script="Thaa"/>
+        <a:font typeface="Mangal" script="Deva"/>
+        <a:font typeface="Gautami" script="Telu"/>
+        <a:font typeface="Latha" script="Taml"/>
+        <a:font typeface="Estrangelo Edessa" script="Syrc"/>
+        <a:font typeface="Kalinga" script="Orya"/>
+        <a:font typeface="Kartika" script="Mlym"/>
+        <a:font typeface="DokChampa" script="Laoo"/>
+        <a:font typeface="Iskoola Pota" script="Sinh"/>
+        <a:font typeface="Mongolian Baiti" script="Mong"/>
+        <a:font typeface="Times New Roman" script="Viet"/>
+        <a:font typeface="Microsoft Uighur" script="Uigh"/>
+      </a:majorFont>
+      <a:minorFont>
+        <a:latin typeface="Arial"/>
+        <a:ea typeface=""/>
+        <a:cs typeface=""/>
+        <a:font typeface="ＭＳ Ｐゴシック" script="Jpan"/>
+        <a:font typeface="맑은 고딕" script="Hang"/>
+        <a:font typeface="宋体" script="Hans"/>
+        <a:font typeface="新細明體" script="Hant"/>
+        <a:font typeface="Arial" script="Arab"/>
+        <a:font typeface="Arial" script="Hebr"/>
+        <a:font typeface="Cordia New" script="Thai"/>
+        <a:font typeface="Nyala" script="Ethi"/>
+        <a:font typeface="Vrinda" script="Beng"/>
+        <a:font typeface="Shruti" script="Gujr"/>
+        <a:font typeface="DaunPenh" script="Khmr"/>
+        <a:font typeface="Tunga" script="Knda"/>
+        <a:font typeface="Raavi" script="Guru"/>
+        <a:font typeface="Euphemia" script="Cans"/>
+        <a:font typeface="Plantagenet Cherokee" script="Cher"/>
+        <a:font typeface="Microsoft Yi Baiti" script="Yiii"/>
+        <a:font typeface="Microsoft Himalaya" script="Tibt"/>
+        <a:font typeface="MV Boli" script="Thaa"/>
+        <a:font typeface="Mangal" script="Deva"/>
+        <a:font typeface="Gautami" script="Telu"/>
+        <a:font typeface="Latha" script="Taml"/>
+        <a:font typeface="Estrangelo Edessa" script="Syrc"/>
+        <a:font typeface="Kalinga" script="Orya"/>
+        <a:font typeface="Kartika" script="Mlym"/>
+        <a:font typeface="DokChampa" script="Laoo"/>
+        <a:font typeface="Iskoola Pota" script="Sinh"/>
+        <a:font typeface="Mongolian Baiti" script="Mong"/>
+        <a:font typeface="Arial" script="Viet"/>
+        <a:font typeface="Microsoft Uighur" script="Uigh"/>
+      </a:minorFont>
+    </a:fontScheme>
+    <a:fmtScheme name="Office">
+      <a:fillStyleLst>
+        <a:solidFill>
+          <a:schemeClr val="phClr"/>
+        </a:solidFill>
+        <a:gradFill rotWithShape="1">
+          <a:gsLst>
+            <a:gs pos="0">
+              <a:schemeClr val="phClr">
+                <a:tint val="50000"/>
+                <a:satMod val="300000"/>
+              </a:schemeClr>
+            </a:gs>
+            <a:gs pos="35000">
+              <a:schemeClr val="phClr">
+                <a:tint val="37000"/>
+                <a:satMod val="300000"/>
+              </a:schemeClr>
+            </a:gs>
+            <a:gs pos="100000">
+              <a:schemeClr val="phClr">
+                <a:tint val="15000"/>
+                <a:satMod val="350000"/>
+              </a:schemeClr>
+            </a:gs>
+          </a:gsLst>
+          <a:lin ang="16200000" scaled="1"/>
+        </a:gradFill>
+        <a:gradFill rotWithShape="1">
+          <a:gsLst>
+            <a:gs pos="0">
+              <a:schemeClr val="phClr">
+                <a:tint val="100000"/>
+                <a:shade val="100000"/>
+                <a:satMod val="130000"/>
+              </a:schemeClr>
+            </a:gs>
+            <a:gs pos="100000">
+              <a:schemeClr val="phClr">
+                <a:tint val="50000"/>
+                <a:shade val="100000"/>
+                <a:satMod val="350000"/>
+              </a:schemeClr>
+            </a:gs>
+          </a:gsLst>
+          <a:lin ang="16200000" scaled="0"/>
+        </a:gradFill>
+      </a:fillStyleLst>
+      <a:lnStyleLst>
+        <a:ln w="9525" algn="ctr" cap="flat" cmpd="sng">
+          <a:solidFill>
+            <a:schemeClr val="phClr">
+              <a:shade val="95000"/>
+              <a:satMod val="105000"/>
+            </a:schemeClr>
+          </a:solidFill>
+          <a:prstDash val="solid"/>
+        </a:ln>
+        <a:ln w="25400" algn="ctr" cap="flat" cmpd="sng">
+          <a:solidFill>
+            <a:schemeClr val="phClr"/>
+          </a:solidFill>
+          <a:prstDash val="solid"/>
+        </a:ln>
+        <a:ln w="38100" algn="ctr" cap="flat" cmpd="sng">
+          <a:solidFill>
+            <a:schemeClr val="phClr"/>
+          </a:solidFill>
+          <a:prstDash val="solid"/>
+        </a:ln>
+      </a:lnStyleLst>
+      <a:effectStyleLst>
+        <a:effectStyle>
+          <a:effectLst>
+            <a:outerShdw rotWithShape="0" dir="5400000" blurRad="40000" dist="20000">
+              <a:srgbClr val="000000">
+                <a:alpha val="38000"/>
+              </a:srgbClr>
+            </a:outerShdw>
+          </a:effectLst>
+        </a:effectStyle>
+        <a:effectStyle>
+          <a:effectLst>
+            <a:outerShdw rotWithShape="0" dir="5400000" blurRad="40000" dist="23000">
+              <a:srgbClr val="000000">
+                <a:alpha val="35000"/>
+              </a:srgbClr>
+            </a:outerShdw>
+          </a:effectLst>
+        </a:effectStyle>
+        <a:effectStyle>
+          <a:effectLst>
+            <a:outerShdw rotWithShape="0" dir="5400000" blurRad="40000" dist="23000">
+              <a:srgbClr val="000000">
+                <a:alpha val="35000"/>
+              </a:srgbClr>
+            </a:outerShdw>
+          </a:effectLst>
+          <a:scene3d>
+            <a:camera prst="orthographicFront">
+              <a:rot rev="0" lon="0" lat="0"/>
+            </a:camera>
+            <a:lightRig dir="t" rig="threePt">
+              <a:rot rev="1200000" lon="0" lat="0"/>
+            </a:lightRig>
+          </a:scene3d>
+          <a:sp3d>
+            <a:bevelT w="63500" h="25400"/>
+          </a:sp3d>
+        </a:effectStyle>
+      </a:effectStyleLst>
+      <a:bgFillStyleLst>
+        <a:solidFill>
+          <a:schemeClr val="phClr"/>
+        </a:solidFill>
+        <a:gradFill rotWithShape="1">
+          <a:gsLst>
+            <a:gs pos="0">
+              <a:schemeClr val="phClr">
+                <a:tint val="40000"/>
+                <a:satMod val="350000"/>
+              </a:schemeClr>
+            </a:gs>
+            <a:gs pos="40000">
+              <a:schemeClr val="phClr">
+                <a:tint val="45000"/>
+                <a:shade val="99000"/>
+                <a:satMod val="350000"/>
+              </a:schemeClr>
+            </a:gs>
+            <a:gs pos="100000">
+              <a:schemeClr val="phClr">
+                <a:shade val="20000"/>
+                <a:satMod val="255000"/>
+              </a:schemeClr>
+            </a:gs>
+          </a:gsLst>
+          <a:path path="circle">
+            <a:fillToRect t="-80000" b="180000" r="50000" l="50000"/>
+          </a:path>
+        </a:gradFill>
+        <a:gradFill rotWithShape="1">
+          <a:gsLst>
+            <a:gs pos="0">
+              <a:schemeClr val="phClr">
+                <a:tint val="80000"/>
+                <a:satMod val="300000"/>
+              </a:schemeClr>
+            </a:gs>
+            <a:gs pos="100000">
+              <a:schemeClr val="phClr">
+                <a:shade val="30000"/>
+                <a:satMod val="200000"/>
+              </a:schemeClr>
+            </a:gs>
+          </a:gsLst>
+          <a:path path="circle">
+            <a:fillToRect t="50000" b="50000" r="50000" l="50000"/>
+          </a:path>
+        </a:gradFill>
+      </a:bgFillStyleLst>
+    </a:fmtScheme>
+  </a:themeElements>
+</a:theme>
+</file>
+
+<file path=ppt/theme/theme3.xml><?xml version="1.0" encoding="utf-8"?>
 <a:theme xmlns:a="http://schemas.openxmlformats.org/drawingml/2006/main" xmlns:r="http://schemas.openxmlformats.org/officeDocument/2006/relationships" name="Office Theme">
   <a:themeElements>
     <a:clrScheme name="Office">
@@ -4235,558 +5423,4 @@
   </a:objectDefaults>
   <a:extraClrSchemeLst/>
 </a:theme>
-</file>
-
-<file path=ppt/theme/theme2.xml><?xml version="1.0" encoding="utf-8"?>
-<a:theme xmlns:a="http://schemas.openxmlformats.org/drawingml/2006/main" xmlns:r="http://schemas.openxmlformats.org/officeDocument/2006/relationships">
-  <a:themeElements>
-    <a:clrScheme name="Custom 347">
-      <a:dk1>
-        <a:srgbClr val="000000"/>
-      </a:dk1>
-      <a:lt1>
-        <a:srgbClr val="FFFFFF"/>
-      </a:lt1>
-      <a:dk2>
-        <a:srgbClr val="666666"/>
-      </a:dk2>
-      <a:lt2>
-        <a:srgbClr val="CCCCCC"/>
-      </a:lt2>
-      <a:accent1>
-        <a:srgbClr val="3A81BA"/>
-      </a:accent1>
-      <a:accent2>
-        <a:srgbClr val="D89F39"/>
-      </a:accent2>
-      <a:accent3>
-        <a:srgbClr val="8BAB42"/>
-      </a:accent3>
-      <a:accent4>
-        <a:srgbClr val="57A7B5"/>
-      </a:accent4>
-      <a:accent5>
-        <a:srgbClr val="8B81D2"/>
-      </a:accent5>
-      <a:accent6>
-        <a:srgbClr val="963334"/>
-      </a:accent6>
-      <a:hlink>
-        <a:srgbClr val="1155CC"/>
-      </a:hlink>
-      <a:folHlink>
-        <a:srgbClr val="6611CC"/>
-      </a:folHlink>
-    </a:clrScheme>
-    <a:fontScheme name="Office">
-      <a:majorFont>
-        <a:latin typeface="Arial"/>
-        <a:ea typeface=""/>
-        <a:cs typeface=""/>
-        <a:font typeface="ＭＳ Ｐゴシック" script="Jpan"/>
-        <a:font typeface="맑은 고딕" script="Hang"/>
-        <a:font typeface="宋体" script="Hans"/>
-        <a:font typeface="新細明體" script="Hant"/>
-        <a:font typeface="Times New Roman" script="Arab"/>
-        <a:font typeface="Times New Roman" script="Hebr"/>
-        <a:font typeface="Angsana New" script="Thai"/>
-        <a:font typeface="Nyala" script="Ethi"/>
-        <a:font typeface="Vrinda" script="Beng"/>
-        <a:font typeface="Shruti" script="Gujr"/>
-        <a:font typeface="MoolBoran" script="Khmr"/>
-        <a:font typeface="Tunga" script="Knda"/>
-        <a:font typeface="Raavi" script="Guru"/>
-        <a:font typeface="Euphemia" script="Cans"/>
-        <a:font typeface="Plantagenet Cherokee" script="Cher"/>
-        <a:font typeface="Microsoft Yi Baiti" script="Yiii"/>
-        <a:font typeface="Microsoft Himalaya" script="Tibt"/>
-        <a:font typeface="MV Boli" script="Thaa"/>
-        <a:font typeface="Mangal" script="Deva"/>
-        <a:font typeface="Gautami" script="Telu"/>
-        <a:font typeface="Latha" script="Taml"/>
-        <a:font typeface="Estrangelo Edessa" script="Syrc"/>
-        <a:font typeface="Kalinga" script="Orya"/>
-        <a:font typeface="Kartika" script="Mlym"/>
-        <a:font typeface="DokChampa" script="Laoo"/>
-        <a:font typeface="Iskoola Pota" script="Sinh"/>
-        <a:font typeface="Mongolian Baiti" script="Mong"/>
-        <a:font typeface="Times New Roman" script="Viet"/>
-        <a:font typeface="Microsoft Uighur" script="Uigh"/>
-      </a:majorFont>
-      <a:minorFont>
-        <a:latin typeface="Arial"/>
-        <a:ea typeface=""/>
-        <a:cs typeface=""/>
-        <a:font typeface="ＭＳ Ｐゴシック" script="Jpan"/>
-        <a:font typeface="맑은 고딕" script="Hang"/>
-        <a:font typeface="宋体" script="Hans"/>
-        <a:font typeface="新細明體" script="Hant"/>
-        <a:font typeface="Arial" script="Arab"/>
-        <a:font typeface="Arial" script="Hebr"/>
-        <a:font typeface="Cordia New" script="Thai"/>
-        <a:font typeface="Nyala" script="Ethi"/>
-        <a:font typeface="Vrinda" script="Beng"/>
-        <a:font typeface="Shruti" script="Gujr"/>
-        <a:font typeface="DaunPenh" script="Khmr"/>
-        <a:font typeface="Tunga" script="Knda"/>
-        <a:font typeface="Raavi" script="Guru"/>
-        <a:font typeface="Euphemia" script="Cans"/>
-        <a:font typeface="Plantagenet Cherokee" script="Cher"/>
-        <a:font typeface="Microsoft Yi Baiti" script="Yiii"/>
-        <a:font typeface="Microsoft Himalaya" script="Tibt"/>
-        <a:font typeface="MV Boli" script="Thaa"/>
-        <a:font typeface="Mangal" script="Deva"/>
-        <a:font typeface="Gautami" script="Telu"/>
-        <a:font typeface="Latha" script="Taml"/>
-        <a:font typeface="Estrangelo Edessa" script="Syrc"/>
-        <a:font typeface="Kalinga" script="Orya"/>
-        <a:font typeface="Kartika" script="Mlym"/>
-        <a:font typeface="DokChampa" script="Laoo"/>
-        <a:font typeface="Iskoola Pota" script="Sinh"/>
-        <a:font typeface="Mongolian Baiti" script="Mong"/>
-        <a:font typeface="Arial" script="Viet"/>
-        <a:font typeface="Microsoft Uighur" script="Uigh"/>
-      </a:minorFont>
-    </a:fontScheme>
-    <a:fmtScheme name="Office">
-      <a:fillStyleLst>
-        <a:solidFill>
-          <a:schemeClr val="phClr"/>
-        </a:solidFill>
-        <a:gradFill rotWithShape="1">
-          <a:gsLst>
-            <a:gs pos="0">
-              <a:schemeClr val="phClr">
-                <a:tint val="50000"/>
-                <a:satMod val="300000"/>
-              </a:schemeClr>
-            </a:gs>
-            <a:gs pos="35000">
-              <a:schemeClr val="phClr">
-                <a:tint val="37000"/>
-                <a:satMod val="300000"/>
-              </a:schemeClr>
-            </a:gs>
-            <a:gs pos="100000">
-              <a:schemeClr val="phClr">
-                <a:tint val="15000"/>
-                <a:satMod val="350000"/>
-              </a:schemeClr>
-            </a:gs>
-          </a:gsLst>
-          <a:lin ang="16200000" scaled="1"/>
-        </a:gradFill>
-        <a:gradFill rotWithShape="1">
-          <a:gsLst>
-            <a:gs pos="0">
-              <a:schemeClr val="phClr">
-                <a:tint val="100000"/>
-                <a:shade val="100000"/>
-                <a:satMod val="130000"/>
-              </a:schemeClr>
-            </a:gs>
-            <a:gs pos="100000">
-              <a:schemeClr val="phClr">
-                <a:tint val="50000"/>
-                <a:shade val="100000"/>
-                <a:satMod val="350000"/>
-              </a:schemeClr>
-            </a:gs>
-          </a:gsLst>
-          <a:lin ang="16200000" scaled="0"/>
-        </a:gradFill>
-      </a:fillStyleLst>
-      <a:lnStyleLst>
-        <a:ln w="9525" algn="ctr" cap="flat" cmpd="sng">
-          <a:solidFill>
-            <a:schemeClr val="phClr">
-              <a:shade val="95000"/>
-              <a:satMod val="105000"/>
-            </a:schemeClr>
-          </a:solidFill>
-          <a:prstDash val="solid"/>
-        </a:ln>
-        <a:ln w="25400" algn="ctr" cap="flat" cmpd="sng">
-          <a:solidFill>
-            <a:schemeClr val="phClr"/>
-          </a:solidFill>
-          <a:prstDash val="solid"/>
-        </a:ln>
-        <a:ln w="38100" algn="ctr" cap="flat" cmpd="sng">
-          <a:solidFill>
-            <a:schemeClr val="phClr"/>
-          </a:solidFill>
-          <a:prstDash val="solid"/>
-        </a:ln>
-      </a:lnStyleLst>
-      <a:effectStyleLst>
-        <a:effectStyle>
-          <a:effectLst>
-            <a:outerShdw rotWithShape="0" dir="5400000" blurRad="40000" dist="20000">
-              <a:srgbClr val="000000">
-                <a:alpha val="38000"/>
-              </a:srgbClr>
-            </a:outerShdw>
-          </a:effectLst>
-        </a:effectStyle>
-        <a:effectStyle>
-          <a:effectLst>
-            <a:outerShdw rotWithShape="0" dir="5400000" blurRad="40000" dist="23000">
-              <a:srgbClr val="000000">
-                <a:alpha val="35000"/>
-              </a:srgbClr>
-            </a:outerShdw>
-          </a:effectLst>
-        </a:effectStyle>
-        <a:effectStyle>
-          <a:effectLst>
-            <a:outerShdw rotWithShape="0" dir="5400000" blurRad="40000" dist="23000">
-              <a:srgbClr val="000000">
-                <a:alpha val="35000"/>
-              </a:srgbClr>
-            </a:outerShdw>
-          </a:effectLst>
-          <a:scene3d>
-            <a:camera prst="orthographicFront">
-              <a:rot rev="0" lon="0" lat="0"/>
-            </a:camera>
-            <a:lightRig dir="t" rig="threePt">
-              <a:rot rev="1200000" lon="0" lat="0"/>
-            </a:lightRig>
-          </a:scene3d>
-          <a:sp3d>
-            <a:bevelT w="63500" h="25400"/>
-          </a:sp3d>
-        </a:effectStyle>
-      </a:effectStyleLst>
-      <a:bgFillStyleLst>
-        <a:solidFill>
-          <a:schemeClr val="phClr"/>
-        </a:solidFill>
-        <a:gradFill rotWithShape="1">
-          <a:gsLst>
-            <a:gs pos="0">
-              <a:schemeClr val="phClr">
-                <a:tint val="40000"/>
-                <a:satMod val="350000"/>
-              </a:schemeClr>
-            </a:gs>
-            <a:gs pos="40000">
-              <a:schemeClr val="phClr">
-                <a:tint val="45000"/>
-                <a:shade val="99000"/>
-                <a:satMod val="350000"/>
-              </a:schemeClr>
-            </a:gs>
-            <a:gs pos="100000">
-              <a:schemeClr val="phClr">
-                <a:shade val="20000"/>
-                <a:satMod val="255000"/>
-              </a:schemeClr>
-            </a:gs>
-          </a:gsLst>
-          <a:path path="circle">
-            <a:fillToRect t="-80000" b="180000" r="50000" l="50000"/>
-          </a:path>
-        </a:gradFill>
-        <a:gradFill rotWithShape="1">
-          <a:gsLst>
-            <a:gs pos="0">
-              <a:schemeClr val="phClr">
-                <a:tint val="80000"/>
-                <a:satMod val="300000"/>
-              </a:schemeClr>
-            </a:gs>
-            <a:gs pos="100000">
-              <a:schemeClr val="phClr">
-                <a:shade val="30000"/>
-                <a:satMod val="200000"/>
-              </a:schemeClr>
-            </a:gs>
-          </a:gsLst>
-          <a:path path="circle">
-            <a:fillToRect t="50000" b="50000" r="50000" l="50000"/>
-          </a:path>
-        </a:gradFill>
-      </a:bgFillStyleLst>
-    </a:fmtScheme>
-  </a:themeElements>
-</a:theme>
-</file>
-
-<file path=ppt/theme/theme3.xml><?xml version="1.0" encoding="utf-8"?>
-<a:theme xmlns:a="http://schemas.openxmlformats.org/drawingml/2006/main" xmlns:r="http://schemas.openxmlformats.org/officeDocument/2006/relationships">
-  <a:themeElements>
-    <a:clrScheme name="Default">
-      <a:dk1>
-        <a:srgbClr val="000000"/>
-      </a:dk1>
-      <a:lt1>
-        <a:srgbClr val="FFFFFF"/>
-      </a:lt1>
-      <a:dk2>
-        <a:srgbClr val="158158"/>
-      </a:dk2>
-      <a:lt2>
-        <a:srgbClr val="F3F3F3"/>
-      </a:lt2>
-      <a:accent1>
-        <a:srgbClr val="058DC7"/>
-      </a:accent1>
-      <a:accent2>
-        <a:srgbClr val="50B432"/>
-      </a:accent2>
-      <a:accent3>
-        <a:srgbClr val="ED561B"/>
-      </a:accent3>
-      <a:accent4>
-        <a:srgbClr val="EDEF00"/>
-      </a:accent4>
-      <a:accent5>
-        <a:srgbClr val="24CBE5"/>
-      </a:accent5>
-      <a:accent6>
-        <a:srgbClr val="64E572"/>
-      </a:accent6>
-      <a:hlink>
-        <a:srgbClr val="2200CC"/>
-      </a:hlink>
-      <a:folHlink>
-        <a:srgbClr val="551A8B"/>
-      </a:folHlink>
-    </a:clrScheme>
-    <a:fontScheme name="Office">
-      <a:majorFont>
-        <a:latin typeface="Arial"/>
-        <a:ea typeface=""/>
-        <a:cs typeface=""/>
-        <a:font typeface="ＭＳ Ｐゴシック" script="Jpan"/>
-        <a:font typeface="맑은 고딕" script="Hang"/>
-        <a:font typeface="宋体" script="Hans"/>
-        <a:font typeface="新細明體" script="Hant"/>
-        <a:font typeface="Times New Roman" script="Arab"/>
-        <a:font typeface="Times New Roman" script="Hebr"/>
-        <a:font typeface="Angsana New" script="Thai"/>
-        <a:font typeface="Nyala" script="Ethi"/>
-        <a:font typeface="Vrinda" script="Beng"/>
-        <a:font typeface="Shruti" script="Gujr"/>
-        <a:font typeface="MoolBoran" script="Khmr"/>
-        <a:font typeface="Tunga" script="Knda"/>
-        <a:font typeface="Raavi" script="Guru"/>
-        <a:font typeface="Euphemia" script="Cans"/>
-        <a:font typeface="Plantagenet Cherokee" script="Cher"/>
-        <a:font typeface="Microsoft Yi Baiti" script="Yiii"/>
-        <a:font typeface="Microsoft Himalaya" script="Tibt"/>
-        <a:font typeface="MV Boli" script="Thaa"/>
-        <a:font typeface="Mangal" script="Deva"/>
-        <a:font typeface="Gautami" script="Telu"/>
-        <a:font typeface="Latha" script="Taml"/>
-        <a:font typeface="Estrangelo Edessa" script="Syrc"/>
-        <a:font typeface="Kalinga" script="Orya"/>
-        <a:font typeface="Kartika" script="Mlym"/>
-        <a:font typeface="DokChampa" script="Laoo"/>
-        <a:font typeface="Iskoola Pota" script="Sinh"/>
-        <a:font typeface="Mongolian Baiti" script="Mong"/>
-        <a:font typeface="Times New Roman" script="Viet"/>
-        <a:font typeface="Microsoft Uighur" script="Uigh"/>
-      </a:majorFont>
-      <a:minorFont>
-        <a:latin typeface="Arial"/>
-        <a:ea typeface=""/>
-        <a:cs typeface=""/>
-        <a:font typeface="ＭＳ Ｐゴシック" script="Jpan"/>
-        <a:font typeface="맑은 고딕" script="Hang"/>
-        <a:font typeface="宋体" script="Hans"/>
-        <a:font typeface="新細明體" script="Hant"/>
-        <a:font typeface="Arial" script="Arab"/>
-        <a:font typeface="Arial" script="Hebr"/>
-        <a:font typeface="Cordia New" script="Thai"/>
-        <a:font typeface="Nyala" script="Ethi"/>
-        <a:font typeface="Vrinda" script="Beng"/>
-        <a:font typeface="Shruti" script="Gujr"/>
-        <a:font typeface="DaunPenh" script="Khmr"/>
-        <a:font typeface="Tunga" script="Knda"/>
-        <a:font typeface="Raavi" script="Guru"/>
-        <a:font typeface="Euphemia" script="Cans"/>
-        <a:font typeface="Plantagenet Cherokee" script="Cher"/>
-        <a:font typeface="Microsoft Yi Baiti" script="Yiii"/>
-        <a:font typeface="Microsoft Himalaya" script="Tibt"/>
-        <a:font typeface="MV Boli" script="Thaa"/>
-        <a:font typeface="Mangal" script="Deva"/>
-        <a:font typeface="Gautami" script="Telu"/>
-        <a:font typeface="Latha" script="Taml"/>
-        <a:font typeface="Estrangelo Edessa" script="Syrc"/>
-        <a:font typeface="Kalinga" script="Orya"/>
-        <a:font typeface="Kartika" script="Mlym"/>
-        <a:font typeface="DokChampa" script="Laoo"/>
-        <a:font typeface="Iskoola Pota" script="Sinh"/>
-        <a:font typeface="Mongolian Baiti" script="Mong"/>
-        <a:font typeface="Arial" script="Viet"/>
-        <a:font typeface="Microsoft Uighur" script="Uigh"/>
-      </a:minorFont>
-    </a:fontScheme>
-    <a:fmtScheme name="Office">
-      <a:fillStyleLst>
-        <a:solidFill>
-          <a:schemeClr val="phClr"/>
-        </a:solidFill>
-        <a:gradFill rotWithShape="1">
-          <a:gsLst>
-            <a:gs pos="0">
-              <a:schemeClr val="phClr">
-                <a:tint val="50000"/>
-                <a:satMod val="300000"/>
-              </a:schemeClr>
-            </a:gs>
-            <a:gs pos="35000">
-              <a:schemeClr val="phClr">
-                <a:tint val="37000"/>
-                <a:satMod val="300000"/>
-              </a:schemeClr>
-            </a:gs>
-            <a:gs pos="100000">
-              <a:schemeClr val="phClr">
-                <a:tint val="15000"/>
-                <a:satMod val="350000"/>
-              </a:schemeClr>
-            </a:gs>
-          </a:gsLst>
-          <a:lin ang="16200000" scaled="1"/>
-        </a:gradFill>
-        <a:gradFill rotWithShape="1">
-          <a:gsLst>
-            <a:gs pos="0">
-              <a:schemeClr val="phClr">
-                <a:tint val="100000"/>
-                <a:shade val="100000"/>
-                <a:satMod val="130000"/>
-              </a:schemeClr>
-            </a:gs>
-            <a:gs pos="100000">
-              <a:schemeClr val="phClr">
-                <a:tint val="50000"/>
-                <a:shade val="100000"/>
-                <a:satMod val="350000"/>
-              </a:schemeClr>
-            </a:gs>
-          </a:gsLst>
-          <a:lin ang="16200000" scaled="0"/>
-        </a:gradFill>
-      </a:fillStyleLst>
-      <a:lnStyleLst>
-        <a:ln w="9525" algn="ctr" cap="flat" cmpd="sng">
-          <a:solidFill>
-            <a:schemeClr val="phClr">
-              <a:shade val="95000"/>
-              <a:satMod val="105000"/>
-            </a:schemeClr>
-          </a:solidFill>
-          <a:prstDash val="solid"/>
-        </a:ln>
-        <a:ln w="25400" algn="ctr" cap="flat" cmpd="sng">
-          <a:solidFill>
-            <a:schemeClr val="phClr"/>
-          </a:solidFill>
-          <a:prstDash val="solid"/>
-        </a:ln>
-        <a:ln w="38100" algn="ctr" cap="flat" cmpd="sng">
-          <a:solidFill>
-            <a:schemeClr val="phClr"/>
-          </a:solidFill>
-          <a:prstDash val="solid"/>
-        </a:ln>
-      </a:lnStyleLst>
-      <a:effectStyleLst>
-        <a:effectStyle>
-          <a:effectLst>
-            <a:outerShdw rotWithShape="0" dir="5400000" blurRad="40000" dist="20000">
-              <a:srgbClr val="000000">
-                <a:alpha val="38000"/>
-              </a:srgbClr>
-            </a:outerShdw>
-          </a:effectLst>
-        </a:effectStyle>
-        <a:effectStyle>
-          <a:effectLst>
-            <a:outerShdw rotWithShape="0" dir="5400000" blurRad="40000" dist="23000">
-              <a:srgbClr val="000000">
-                <a:alpha val="35000"/>
-              </a:srgbClr>
-            </a:outerShdw>
-          </a:effectLst>
-        </a:effectStyle>
-        <a:effectStyle>
-          <a:effectLst>
-            <a:outerShdw rotWithShape="0" dir="5400000" blurRad="40000" dist="23000">
-              <a:srgbClr val="000000">
-                <a:alpha val="35000"/>
-              </a:srgbClr>
-            </a:outerShdw>
-          </a:effectLst>
-          <a:scene3d>
-            <a:camera prst="orthographicFront">
-              <a:rot rev="0" lon="0" lat="0"/>
-            </a:camera>
-            <a:lightRig dir="t" rig="threePt">
-              <a:rot rev="1200000" lon="0" lat="0"/>
-            </a:lightRig>
-          </a:scene3d>
-          <a:sp3d>
-            <a:bevelT w="63500" h="25400"/>
-          </a:sp3d>
-        </a:effectStyle>
-      </a:effectStyleLst>
-      <a:bgFillStyleLst>
-        <a:solidFill>
-          <a:schemeClr val="phClr"/>
-        </a:solidFill>
-        <a:gradFill rotWithShape="1">
-          <a:gsLst>
-            <a:gs pos="0">
-              <a:schemeClr val="phClr">
-                <a:tint val="40000"/>
-                <a:satMod val="350000"/>
-              </a:schemeClr>
-            </a:gs>
-            <a:gs pos="40000">
-              <a:schemeClr val="phClr">
-                <a:tint val="45000"/>
-                <a:shade val="99000"/>
-                <a:satMod val="350000"/>
-              </a:schemeClr>
-            </a:gs>
-            <a:gs pos="100000">
-              <a:schemeClr val="phClr">
-                <a:shade val="20000"/>
-                <a:satMod val="255000"/>
-              </a:schemeClr>
-            </a:gs>
-          </a:gsLst>
-          <a:path path="circle">
-            <a:fillToRect t="-80000" b="180000" r="50000" l="50000"/>
-          </a:path>
-        </a:gradFill>
-        <a:gradFill rotWithShape="1">
-          <a:gsLst>
-            <a:gs pos="0">
-              <a:schemeClr val="phClr">
-                <a:tint val="80000"/>
-                <a:satMod val="300000"/>
-              </a:schemeClr>
-            </a:gs>
-            <a:gs pos="100000">
-              <a:schemeClr val="phClr">
-                <a:shade val="30000"/>
-                <a:satMod val="200000"/>
-              </a:schemeClr>
-            </a:gs>
-          </a:gsLst>
-          <a:path path="circle">
-            <a:fillToRect t="50000" b="50000" r="50000" l="50000"/>
-          </a:path>
-        </a:gradFill>
-      </a:bgFillStyleLst>
-    </a:fmtScheme>
-  </a:themeElements>
-</a:theme>
 </file>
</xml_diff>